<commit_message>
modified schedule & update lin. algebra and MVN
</commit_message>
<xml_diff>
--- a/STT465_linearAlgebraReview.pptx
+++ b/STT465_linearAlgebraReview.pptx
@@ -5,13 +5,15 @@
     <p:sldMasterId id="2147483648" r:id="rId1"/>
   </p:sldMasterIdLst>
   <p:notesMasterIdLst>
-    <p:notesMasterId r:id="rId6"/>
+    <p:notesMasterId r:id="rId8"/>
   </p:notesMasterIdLst>
   <p:sldIdLst>
     <p:sldId id="338" r:id="rId2"/>
     <p:sldId id="339" r:id="rId3"/>
     <p:sldId id="353" r:id="rId4"/>
     <p:sldId id="356" r:id="rId5"/>
+    <p:sldId id="357" r:id="rId6"/>
+    <p:sldId id="358" r:id="rId7"/>
   </p:sldIdLst>
   <p:sldSz cx="9144000" cy="6858000" type="screen4x3"/>
   <p:notesSz cx="6858000" cy="9144000"/>
@@ -202,7 +204,7 @@
             <a:fld id="{EC2AD4C0-0FC1-44D9-A720-D776D6428221}" type="datetimeFigureOut">
               <a:rPr lang="en-US" smtClean="0"/>
               <a:pPr/>
-              <a:t>10/7/15</a:t>
+              <a:t>10/12/15</a:t>
             </a:fld>
             <a:endParaRPr lang="en-US"/>
           </a:p>
@@ -801,6 +803,170 @@
 </p:notes>
 </file>
 
+<file path=ppt/notesSlides/notesSlide5.xml><?xml version="1.0" encoding="utf-8"?>
+<p:notes xmlns:a="http://schemas.openxmlformats.org/drawingml/2006/main" xmlns:r="http://schemas.openxmlformats.org/officeDocument/2006/relationships" xmlns:p="http://schemas.openxmlformats.org/presentationml/2006/main">
+  <p:cSld>
+    <p:spTree>
+      <p:nvGrpSpPr>
+        <p:cNvPr id="1" name=""/>
+        <p:cNvGrpSpPr/>
+        <p:nvPr/>
+      </p:nvGrpSpPr>
+      <p:grpSpPr>
+        <a:xfrm>
+          <a:off x="0" y="0"/>
+          <a:ext cx="0" cy="0"/>
+          <a:chOff x="0" y="0"/>
+          <a:chExt cx="0" cy="0"/>
+        </a:xfrm>
+      </p:grpSpPr>
+      <p:sp>
+        <p:nvSpPr>
+          <p:cNvPr id="2" name="Slide Image Placeholder 1"/>
+          <p:cNvSpPr>
+            <a:spLocks noGrp="1" noRot="1" noChangeAspect="1"/>
+          </p:cNvSpPr>
+          <p:nvPr>
+            <p:ph type="sldImg"/>
+          </p:nvPr>
+        </p:nvSpPr>
+        <p:spPr/>
+      </p:sp>
+      <p:sp>
+        <p:nvSpPr>
+          <p:cNvPr id="3" name="Notes Placeholder 2"/>
+          <p:cNvSpPr>
+            <a:spLocks noGrp="1"/>
+          </p:cNvSpPr>
+          <p:nvPr>
+            <p:ph type="body" idx="1"/>
+          </p:nvPr>
+        </p:nvSpPr>
+        <p:spPr/>
+        <p:txBody>
+          <a:bodyPr>
+            <a:normAutofit/>
+          </a:bodyPr>
+          <a:lstStyle/>
+          <a:p>
+            <a:endParaRPr lang="en-US" dirty="0"/>
+          </a:p>
+        </p:txBody>
+      </p:sp>
+      <p:sp>
+        <p:nvSpPr>
+          <p:cNvPr id="4" name="Slide Number Placeholder 3"/>
+          <p:cNvSpPr>
+            <a:spLocks noGrp="1"/>
+          </p:cNvSpPr>
+          <p:nvPr>
+            <p:ph type="sldNum" sz="quarter" idx="10"/>
+          </p:nvPr>
+        </p:nvSpPr>
+        <p:spPr/>
+        <p:txBody>
+          <a:bodyPr/>
+          <a:lstStyle/>
+          <a:p>
+            <a:fld id="{CACBEE2F-8C26-493F-9430-82D1D1B7C623}" type="slidenum">
+              <a:rPr lang="en-US" smtClean="0"/>
+              <a:pPr/>
+              <a:t>5</a:t>
+            </a:fld>
+            <a:endParaRPr lang="en-US"/>
+          </a:p>
+        </p:txBody>
+      </p:sp>
+    </p:spTree>
+  </p:cSld>
+  <p:clrMapOvr>
+    <a:masterClrMapping/>
+  </p:clrMapOvr>
+</p:notes>
+</file>
+
+<file path=ppt/notesSlides/notesSlide6.xml><?xml version="1.0" encoding="utf-8"?>
+<p:notes xmlns:a="http://schemas.openxmlformats.org/drawingml/2006/main" xmlns:r="http://schemas.openxmlformats.org/officeDocument/2006/relationships" xmlns:p="http://schemas.openxmlformats.org/presentationml/2006/main">
+  <p:cSld>
+    <p:spTree>
+      <p:nvGrpSpPr>
+        <p:cNvPr id="1" name=""/>
+        <p:cNvGrpSpPr/>
+        <p:nvPr/>
+      </p:nvGrpSpPr>
+      <p:grpSpPr>
+        <a:xfrm>
+          <a:off x="0" y="0"/>
+          <a:ext cx="0" cy="0"/>
+          <a:chOff x="0" y="0"/>
+          <a:chExt cx="0" cy="0"/>
+        </a:xfrm>
+      </p:grpSpPr>
+      <p:sp>
+        <p:nvSpPr>
+          <p:cNvPr id="2" name="Slide Image Placeholder 1"/>
+          <p:cNvSpPr>
+            <a:spLocks noGrp="1" noRot="1" noChangeAspect="1"/>
+          </p:cNvSpPr>
+          <p:nvPr>
+            <p:ph type="sldImg"/>
+          </p:nvPr>
+        </p:nvSpPr>
+        <p:spPr/>
+      </p:sp>
+      <p:sp>
+        <p:nvSpPr>
+          <p:cNvPr id="3" name="Notes Placeholder 2"/>
+          <p:cNvSpPr>
+            <a:spLocks noGrp="1"/>
+          </p:cNvSpPr>
+          <p:nvPr>
+            <p:ph type="body" idx="1"/>
+          </p:nvPr>
+        </p:nvSpPr>
+        <p:spPr/>
+        <p:txBody>
+          <a:bodyPr>
+            <a:normAutofit/>
+          </a:bodyPr>
+          <a:lstStyle/>
+          <a:p>
+            <a:endParaRPr lang="en-US" dirty="0"/>
+          </a:p>
+        </p:txBody>
+      </p:sp>
+      <p:sp>
+        <p:nvSpPr>
+          <p:cNvPr id="4" name="Slide Number Placeholder 3"/>
+          <p:cNvSpPr>
+            <a:spLocks noGrp="1"/>
+          </p:cNvSpPr>
+          <p:nvPr>
+            <p:ph type="sldNum" sz="quarter" idx="10"/>
+          </p:nvPr>
+        </p:nvSpPr>
+        <p:spPr/>
+        <p:txBody>
+          <a:bodyPr/>
+          <a:lstStyle/>
+          <a:p>
+            <a:fld id="{CACBEE2F-8C26-493F-9430-82D1D1B7C623}" type="slidenum">
+              <a:rPr lang="en-US" smtClean="0"/>
+              <a:pPr/>
+              <a:t>6</a:t>
+            </a:fld>
+            <a:endParaRPr lang="en-US"/>
+          </a:p>
+        </p:txBody>
+      </p:sp>
+    </p:spTree>
+  </p:cSld>
+  <p:clrMapOvr>
+    <a:masterClrMapping/>
+  </p:clrMapOvr>
+</p:notes>
+</file>
+
 <file path=ppt/slideLayouts/slideLayout1.xml><?xml version="1.0" encoding="utf-8"?>
 <p:sldLayout xmlns:a="http://schemas.openxmlformats.org/drawingml/2006/main" xmlns:r="http://schemas.openxmlformats.org/officeDocument/2006/relationships" xmlns:p="http://schemas.openxmlformats.org/presentationml/2006/main" type="title" preserve="1">
   <p:cSld name="Title Slide">
@@ -983,7 +1149,7 @@
             <a:fld id="{F9C811E6-0209-4075-80E7-F5953C8ECEE3}" type="datetime1">
               <a:rPr lang="en-US" smtClean="0"/>
               <a:pPr/>
-              <a:t>10/7/15</a:t>
+              <a:t>10/12/15</a:t>
             </a:fld>
             <a:endParaRPr lang="en-US"/>
           </a:p>
@@ -1154,7 +1320,7 @@
             <a:fld id="{648E6BB1-E6D9-4EE7-828F-046F7223761D}" type="datetime1">
               <a:rPr lang="en-US" smtClean="0"/>
               <a:pPr/>
-              <a:t>10/7/15</a:t>
+              <a:t>10/12/15</a:t>
             </a:fld>
             <a:endParaRPr lang="en-US"/>
           </a:p>
@@ -1335,7 +1501,7 @@
             <a:fld id="{B4B9C580-A780-4D76-B2D1-C34F1DA97DF0}" type="datetime1">
               <a:rPr lang="en-US" smtClean="0"/>
               <a:pPr/>
-              <a:t>10/7/15</a:t>
+              <a:t>10/12/15</a:t>
             </a:fld>
             <a:endParaRPr lang="en-US"/>
           </a:p>
@@ -1506,7 +1672,7 @@
             <a:fld id="{EB19DDAF-3255-4785-974C-BB4FAF02D67E}" type="datetime1">
               <a:rPr lang="en-US" smtClean="0"/>
               <a:pPr/>
-              <a:t>10/7/15</a:t>
+              <a:t>10/12/15</a:t>
             </a:fld>
             <a:endParaRPr lang="en-US"/>
           </a:p>
@@ -1753,7 +1919,7 @@
             <a:fld id="{C344AF86-11D1-4E84-BA60-17130236FDAA}" type="datetime1">
               <a:rPr lang="en-US" smtClean="0"/>
               <a:pPr/>
-              <a:t>10/7/15</a:t>
+              <a:t>10/12/15</a:t>
             </a:fld>
             <a:endParaRPr lang="en-US"/>
           </a:p>
@@ -2042,7 +2208,7 @@
             <a:fld id="{A8DD670F-7E07-4783-A6F8-B28127B5AF4A}" type="datetime1">
               <a:rPr lang="en-US" smtClean="0"/>
               <a:pPr/>
-              <a:t>10/7/15</a:t>
+              <a:t>10/12/15</a:t>
             </a:fld>
             <a:endParaRPr lang="en-US"/>
           </a:p>
@@ -2465,7 +2631,7 @@
             <a:fld id="{92676DD9-688F-48EE-8233-B3B78BDDA63D}" type="datetime1">
               <a:rPr lang="en-US" smtClean="0"/>
               <a:pPr/>
-              <a:t>10/7/15</a:t>
+              <a:t>10/12/15</a:t>
             </a:fld>
             <a:endParaRPr lang="en-US"/>
           </a:p>
@@ -2584,7 +2750,7 @@
             <a:fld id="{F6CC4A83-AE34-48B8-B90E-70388FDBF0F7}" type="datetime1">
               <a:rPr lang="en-US" smtClean="0"/>
               <a:pPr/>
-              <a:t>10/7/15</a:t>
+              <a:t>10/12/15</a:t>
             </a:fld>
             <a:endParaRPr lang="en-US"/>
           </a:p>
@@ -2680,7 +2846,7 @@
             <a:fld id="{510CA3E2-9601-488E-B92B-23013819BD02}" type="datetime1">
               <a:rPr lang="en-US" smtClean="0"/>
               <a:pPr/>
-              <a:t>10/7/15</a:t>
+              <a:t>10/12/15</a:t>
             </a:fld>
             <a:endParaRPr lang="en-US"/>
           </a:p>
@@ -2958,7 +3124,7 @@
             <a:fld id="{331F1CBD-358A-4E18-86FD-C337233E15F0}" type="datetime1">
               <a:rPr lang="en-US" smtClean="0"/>
               <a:pPr/>
-              <a:t>10/7/15</a:t>
+              <a:t>10/12/15</a:t>
             </a:fld>
             <a:endParaRPr lang="en-US"/>
           </a:p>
@@ -3212,7 +3378,7 @@
             <a:fld id="{3CB4F0D5-901F-4458-A8F8-F062616694B4}" type="datetime1">
               <a:rPr lang="en-US" smtClean="0"/>
               <a:pPr/>
-              <a:t>10/7/15</a:t>
+              <a:t>10/12/15</a:t>
             </a:fld>
             <a:endParaRPr lang="en-US"/>
           </a:p>
@@ -3426,7 +3592,7 @@
             <a:fld id="{F77D84EF-BDBF-448B-906E-D51D4CAF22DC}" type="datetime1">
               <a:rPr lang="en-US" smtClean="0"/>
               <a:pPr/>
-              <a:t>10/7/15</a:t>
+              <a:t>10/12/15</a:t>
             </a:fld>
             <a:endParaRPr lang="en-US"/>
           </a:p>
@@ -3814,13 +3980,13 @@
         </p:nvSpPr>
         <p:spPr>
           <a:xfrm>
-            <a:off x="990600" y="2133600"/>
-            <a:ext cx="7772400" cy="762000"/>
+            <a:off x="990600" y="2057400"/>
+            <a:ext cx="7772400" cy="2895600"/>
           </a:xfrm>
         </p:spPr>
         <p:txBody>
           <a:bodyPr>
-            <a:normAutofit fontScale="90000"/>
+            <a:normAutofit/>
           </a:bodyPr>
           <a:lstStyle/>
           <a:p>
@@ -3880,8 +4046,54 @@
                   </a:schemeClr>
                 </a:solidFill>
               </a:rPr>
-              <a:t>Quick Review of Linear Algebra</a:t>
-            </a:r>
+              <a:t>I. Quick </a:t>
+            </a:r>
+            <a:r>
+              <a:rPr lang="en-US" sz="3200" dirty="0" smtClean="0">
+                <a:solidFill>
+                  <a:schemeClr val="accent2">
+                    <a:lumMod val="75000"/>
+                  </a:schemeClr>
+                </a:solidFill>
+              </a:rPr>
+              <a:t>Review of Linear </a:t>
+            </a:r>
+            <a:r>
+              <a:rPr lang="en-US" sz="3200" dirty="0" smtClean="0">
+                <a:solidFill>
+                  <a:schemeClr val="accent2">
+                    <a:lumMod val="75000"/>
+                  </a:schemeClr>
+                </a:solidFill>
+              </a:rPr>
+              <a:t>Algebra</a:t>
+            </a:r>
+            <a:br>
+              <a:rPr lang="en-US" sz="3200" dirty="0" smtClean="0">
+                <a:solidFill>
+                  <a:schemeClr val="accent2">
+                    <a:lumMod val="75000"/>
+                  </a:schemeClr>
+                </a:solidFill>
+              </a:rPr>
+            </a:br>
+            <a:r>
+              <a:rPr lang="en-US" sz="3200" dirty="0" smtClean="0">
+                <a:solidFill>
+                  <a:schemeClr val="accent2">
+                    <a:lumMod val="75000"/>
+                  </a:schemeClr>
+                </a:solidFill>
+              </a:rPr>
+              <a:t>II. Multivariate Normal Distribution</a:t>
+            </a:r>
+            <a:endParaRPr lang="en-US" sz="3200" dirty="0" smtClean="0">
+              <a:solidFill>
+                <a:schemeClr val="accent2">
+                  <a:lumMod val="75000"/>
+                </a:schemeClr>
+              </a:solidFill>
+            </a:endParaRPr>
           </a:p>
         </p:txBody>
       </p:sp>
@@ -5087,7 +5299,27 @@
                   </a:schemeClr>
                 </a:solidFill>
               </a:rPr>
-              <a:t>Matrices, linear spaces and orthogonal projections.</a:t>
+              <a:t>Matrices, linear spaces and </a:t>
+            </a:r>
+            <a:r>
+              <a:rPr lang="en-US" dirty="0" smtClean="0">
+                <a:solidFill>
+                  <a:schemeClr val="accent1">
+                    <a:lumMod val="75000"/>
+                  </a:schemeClr>
+                </a:solidFill>
+              </a:rPr>
+              <a:t>projections</a:t>
+            </a:r>
+            <a:r>
+              <a:rPr lang="en-US" dirty="0" smtClean="0">
+                <a:solidFill>
+                  <a:schemeClr val="accent1">
+                    <a:lumMod val="75000"/>
+                  </a:schemeClr>
+                </a:solidFill>
+              </a:rPr>
+              <a:t>.</a:t>
             </a:r>
           </a:p>
           <a:p>
@@ -5527,6 +5759,1013 @@
     <p:extLst>
       <p:ext uri="{BB962C8B-B14F-4D97-AF65-F5344CB8AC3E}">
         <p14:creationId xmlns:p14="http://schemas.microsoft.com/office/powerpoint/2010/main" val="1492395066"/>
+      </p:ext>
+    </p:extLst>
+  </p:cSld>
+  <p:clrMapOvr>
+    <a:masterClrMapping/>
+  </p:clrMapOvr>
+  <p:timing>
+    <p:tnLst>
+      <p:par>
+        <p:cTn xmlns:p14="http://schemas.microsoft.com/office/powerpoint/2010/main" id="1" dur="indefinite" restart="never" nodeType="tmRoot"/>
+      </p:par>
+    </p:tnLst>
+  </p:timing>
+</p:sld>
+</file>
+
+<file path=ppt/slides/slide5.xml><?xml version="1.0" encoding="utf-8"?>
+<p:sld xmlns:a="http://schemas.openxmlformats.org/drawingml/2006/main" xmlns:r="http://schemas.openxmlformats.org/officeDocument/2006/relationships" xmlns:p="http://schemas.openxmlformats.org/presentationml/2006/main">
+  <p:cSld>
+    <p:spTree>
+      <p:nvGrpSpPr>
+        <p:cNvPr id="1" name=""/>
+        <p:cNvGrpSpPr/>
+        <p:nvPr/>
+      </p:nvGrpSpPr>
+      <p:grpSpPr>
+        <a:xfrm>
+          <a:off x="0" y="0"/>
+          <a:ext cx="0" cy="0"/>
+          <a:chOff x="0" y="0"/>
+          <a:chExt cx="0" cy="0"/>
+        </a:xfrm>
+      </p:grpSpPr>
+      <p:sp>
+        <p:nvSpPr>
+          <p:cNvPr id="2" name="Title 1"/>
+          <p:cNvSpPr>
+            <a:spLocks noGrp="1"/>
+          </p:cNvSpPr>
+          <p:nvPr>
+            <p:ph type="ctrTitle"/>
+          </p:nvPr>
+        </p:nvSpPr>
+        <p:spPr>
+          <a:xfrm>
+            <a:off x="609600" y="76201"/>
+            <a:ext cx="7772400" cy="762000"/>
+          </a:xfrm>
+        </p:spPr>
+        <p:txBody>
+          <a:bodyPr>
+            <a:normAutofit/>
+          </a:bodyPr>
+          <a:lstStyle/>
+          <a:p>
+            <a:r>
+              <a:rPr lang="en-US" sz="3200" dirty="0" smtClean="0">
+                <a:solidFill>
+                  <a:schemeClr val="accent2">
+                    <a:lumMod val="75000"/>
+                  </a:schemeClr>
+                </a:solidFill>
+              </a:rPr>
+              <a:t>Matrices and Random Variables</a:t>
+            </a:r>
+            <a:endParaRPr lang="en-US" sz="3200" dirty="0">
+              <a:solidFill>
+                <a:schemeClr val="accent2">
+                  <a:lumMod val="75000"/>
+                </a:schemeClr>
+              </a:solidFill>
+            </a:endParaRPr>
+          </a:p>
+        </p:txBody>
+      </p:sp>
+      <p:sp>
+        <p:nvSpPr>
+          <p:cNvPr id="4" name="Footer Placeholder 3"/>
+          <p:cNvSpPr>
+            <a:spLocks noGrp="1"/>
+          </p:cNvSpPr>
+          <p:nvPr>
+            <p:ph type="ftr" sz="quarter" idx="11"/>
+          </p:nvPr>
+        </p:nvSpPr>
+        <p:spPr/>
+        <p:txBody>
+          <a:bodyPr/>
+          <a:lstStyle/>
+          <a:p>
+            <a:r>
+              <a:rPr lang="en-US" dirty="0" smtClean="0">
+                <a:solidFill>
+                  <a:schemeClr val="accent1"/>
+                </a:solidFill>
+              </a:rPr>
+              <a:t>STT 465, MSU, Fall, 2015</a:t>
+            </a:r>
+            <a:endParaRPr lang="en-US" dirty="0">
+              <a:solidFill>
+                <a:schemeClr val="accent1"/>
+              </a:solidFill>
+            </a:endParaRPr>
+          </a:p>
+        </p:txBody>
+      </p:sp>
+      <p:sp>
+        <p:nvSpPr>
+          <p:cNvPr id="6" name="TextBox 5"/>
+          <p:cNvSpPr txBox="1"/>
+          <p:nvPr/>
+        </p:nvSpPr>
+        <p:spPr>
+          <a:xfrm>
+            <a:off x="381000" y="762000"/>
+            <a:ext cx="8229600" cy="5355313"/>
+          </a:xfrm>
+          <a:prstGeom prst="rect">
+            <a:avLst/>
+          </a:prstGeom>
+          <a:noFill/>
+          <a:ln>
+            <a:solidFill>
+              <a:srgbClr val="800000"/>
+            </a:solidFill>
+            <a:prstDash val="sysDash"/>
+          </a:ln>
+        </p:spPr>
+        <p:txBody>
+          <a:bodyPr wrap="square" rtlCol="0">
+            <a:spAutoFit/>
+          </a:bodyPr>
+          <a:lstStyle/>
+          <a:p>
+            <a:r>
+              <a:rPr lang="en-US" dirty="0" smtClean="0">
+                <a:solidFill>
+                  <a:schemeClr val="accent1">
+                    <a:lumMod val="75000"/>
+                  </a:schemeClr>
+                </a:solidFill>
+              </a:rPr>
+              <a:t>- </a:t>
+            </a:r>
+            <a:r>
+              <a:rPr lang="en-US" b="1" u="sng" dirty="0" smtClean="0">
+                <a:solidFill>
+                  <a:schemeClr val="accent1">
+                    <a:lumMod val="75000"/>
+                  </a:schemeClr>
+                </a:solidFill>
+              </a:rPr>
+              <a:t>IID Standard Normal </a:t>
+            </a:r>
+          </a:p>
+          <a:p>
+            <a:endParaRPr lang="en-US" dirty="0">
+              <a:solidFill>
+                <a:schemeClr val="accent1">
+                  <a:lumMod val="75000"/>
+                </a:schemeClr>
+              </a:solidFill>
+            </a:endParaRPr>
+          </a:p>
+          <a:p>
+            <a:endParaRPr lang="en-US" dirty="0" smtClean="0">
+              <a:solidFill>
+                <a:schemeClr val="accent1">
+                  <a:lumMod val="75000"/>
+                </a:schemeClr>
+              </a:solidFill>
+            </a:endParaRPr>
+          </a:p>
+          <a:p>
+            <a:endParaRPr lang="en-US" dirty="0">
+              <a:solidFill>
+                <a:schemeClr val="accent1">
+                  <a:lumMod val="75000"/>
+                </a:schemeClr>
+              </a:solidFill>
+            </a:endParaRPr>
+          </a:p>
+          <a:p>
+            <a:endParaRPr lang="en-US" dirty="0">
+              <a:solidFill>
+                <a:schemeClr val="accent1">
+                  <a:lumMod val="75000"/>
+                </a:schemeClr>
+              </a:solidFill>
+            </a:endParaRPr>
+          </a:p>
+          <a:p>
+            <a:endParaRPr lang="en-US" dirty="0" smtClean="0">
+              <a:solidFill>
+                <a:schemeClr val="accent1">
+                  <a:lumMod val="75000"/>
+                </a:schemeClr>
+              </a:solidFill>
+            </a:endParaRPr>
+          </a:p>
+          <a:p>
+            <a:r>
+              <a:rPr lang="en-US" dirty="0">
+                <a:solidFill>
+                  <a:schemeClr val="accent1">
+                    <a:lumMod val="75000"/>
+                  </a:schemeClr>
+                </a:solidFill>
+              </a:rPr>
+              <a:t>- </a:t>
+            </a:r>
+            <a:r>
+              <a:rPr lang="en-US" b="1" u="sng" dirty="0" smtClean="0">
+                <a:solidFill>
+                  <a:schemeClr val="accent1">
+                    <a:lumMod val="75000"/>
+                  </a:schemeClr>
+                </a:solidFill>
+              </a:rPr>
+              <a:t>In Matrix Notation</a:t>
+            </a:r>
+            <a:endParaRPr lang="en-US" b="1" u="sng" dirty="0">
+              <a:solidFill>
+                <a:schemeClr val="accent1">
+                  <a:lumMod val="75000"/>
+                </a:schemeClr>
+              </a:solidFill>
+            </a:endParaRPr>
+          </a:p>
+          <a:p>
+            <a:endParaRPr lang="en-US" dirty="0">
+              <a:solidFill>
+                <a:schemeClr val="accent1">
+                  <a:lumMod val="75000"/>
+                </a:schemeClr>
+              </a:solidFill>
+            </a:endParaRPr>
+          </a:p>
+          <a:p>
+            <a:endParaRPr lang="en-US" dirty="0" smtClean="0">
+              <a:solidFill>
+                <a:schemeClr val="accent1">
+                  <a:lumMod val="75000"/>
+                </a:schemeClr>
+              </a:solidFill>
+            </a:endParaRPr>
+          </a:p>
+          <a:p>
+            <a:endParaRPr lang="en-US" dirty="0">
+              <a:solidFill>
+                <a:schemeClr val="accent1">
+                  <a:lumMod val="75000"/>
+                </a:schemeClr>
+              </a:solidFill>
+            </a:endParaRPr>
+          </a:p>
+          <a:p>
+            <a:endParaRPr lang="en-US" dirty="0" smtClean="0">
+              <a:solidFill>
+                <a:schemeClr val="accent1">
+                  <a:lumMod val="75000"/>
+                </a:schemeClr>
+              </a:solidFill>
+            </a:endParaRPr>
+          </a:p>
+          <a:p>
+            <a:endParaRPr lang="en-US" dirty="0">
+              <a:solidFill>
+                <a:schemeClr val="accent1">
+                  <a:lumMod val="75000"/>
+                </a:schemeClr>
+              </a:solidFill>
+            </a:endParaRPr>
+          </a:p>
+          <a:p>
+            <a:endParaRPr lang="en-US" dirty="0" smtClean="0">
+              <a:solidFill>
+                <a:schemeClr val="accent1">
+                  <a:lumMod val="75000"/>
+                </a:schemeClr>
+              </a:solidFill>
+            </a:endParaRPr>
+          </a:p>
+          <a:p>
+            <a:endParaRPr lang="en-US" dirty="0">
+              <a:solidFill>
+                <a:schemeClr val="accent1">
+                  <a:lumMod val="75000"/>
+                </a:schemeClr>
+              </a:solidFill>
+            </a:endParaRPr>
+          </a:p>
+          <a:p>
+            <a:endParaRPr lang="en-US" dirty="0" smtClean="0">
+              <a:solidFill>
+                <a:schemeClr val="accent1">
+                  <a:lumMod val="75000"/>
+                </a:schemeClr>
+              </a:solidFill>
+            </a:endParaRPr>
+          </a:p>
+          <a:p>
+            <a:endParaRPr lang="en-US" dirty="0">
+              <a:solidFill>
+                <a:schemeClr val="accent1">
+                  <a:lumMod val="75000"/>
+                </a:schemeClr>
+              </a:solidFill>
+            </a:endParaRPr>
+          </a:p>
+          <a:p>
+            <a:endParaRPr lang="en-US" dirty="0" smtClean="0">
+              <a:solidFill>
+                <a:schemeClr val="accent1">
+                  <a:lumMod val="75000"/>
+                </a:schemeClr>
+              </a:solidFill>
+            </a:endParaRPr>
+          </a:p>
+          <a:p>
+            <a:endParaRPr lang="en-US" dirty="0">
+              <a:solidFill>
+                <a:schemeClr val="accent1">
+                  <a:lumMod val="75000"/>
+                </a:schemeClr>
+              </a:solidFill>
+            </a:endParaRPr>
+          </a:p>
+          <a:p>
+            <a:endParaRPr lang="en-US" dirty="0">
+              <a:solidFill>
+                <a:schemeClr val="accent1">
+                  <a:lumMod val="75000"/>
+                </a:schemeClr>
+              </a:solidFill>
+            </a:endParaRPr>
+          </a:p>
+        </p:txBody>
+      </p:sp>
+      <p:graphicFrame>
+        <p:nvGraphicFramePr>
+          <p:cNvPr id="3" name="Object 2"/>
+          <p:cNvGraphicFramePr>
+            <a:graphicFrameLocks noChangeAspect="1"/>
+          </p:cNvGraphicFramePr>
+          <p:nvPr>
+            <p:extLst>
+              <p:ext uri="{D42A27DB-BD31-4B8C-83A1-F6EECF244321}">
+                <p14:modId xmlns:p14="http://schemas.microsoft.com/office/powerpoint/2010/main" val="2225022077"/>
+              </p:ext>
+            </p:extLst>
+          </p:nvPr>
+        </p:nvGraphicFramePr>
+        <p:xfrm>
+          <a:off x="2819400" y="914400"/>
+          <a:ext cx="5065713" cy="1154618"/>
+        </p:xfrm>
+        <a:graphic>
+          <a:graphicData uri="http://schemas.openxmlformats.org/presentationml/2006/ole">
+            <mc:AlternateContent xmlns:mc="http://schemas.openxmlformats.org/markup-compatibility/2006">
+              <mc:Choice xmlns:v="urn:schemas-microsoft-com:vml" Requires="v">
+                <p:oleObj spid="_x0000_s1028" name="Equation" r:id="rId4" imgW="2451100" imgH="558800" progId="Equation.3">
+                  <p:embed/>
+                </p:oleObj>
+              </mc:Choice>
+              <mc:Fallback>
+                <p:oleObj name="Equation" r:id="rId4" imgW="2451100" imgH="558800" progId="Equation.3">
+                  <p:embed/>
+                  <p:pic>
+                    <p:nvPicPr>
+                      <p:cNvPr id="0" name=""/>
+                      <p:cNvPicPr/>
+                      <p:nvPr/>
+                    </p:nvPicPr>
+                    <p:blipFill>
+                      <a:blip r:embed="rId5"/>
+                      <a:stretch>
+                        <a:fillRect/>
+                      </a:stretch>
+                    </p:blipFill>
+                    <p:spPr>
+                      <a:xfrm>
+                        <a:off x="2819400" y="914400"/>
+                        <a:ext cx="5065713" cy="1154618"/>
+                      </a:xfrm>
+                      <a:prstGeom prst="rect">
+                        <a:avLst/>
+                      </a:prstGeom>
+                    </p:spPr>
+                  </p:pic>
+                </p:oleObj>
+              </mc:Fallback>
+            </mc:AlternateContent>
+          </a:graphicData>
+        </a:graphic>
+      </p:graphicFrame>
+      <p:graphicFrame>
+        <p:nvGraphicFramePr>
+          <p:cNvPr id="5" name="Object 4"/>
+          <p:cNvGraphicFramePr>
+            <a:graphicFrameLocks noChangeAspect="1"/>
+          </p:cNvGraphicFramePr>
+          <p:nvPr>
+            <p:extLst>
+              <p:ext uri="{D42A27DB-BD31-4B8C-83A1-F6EECF244321}">
+                <p14:modId xmlns:p14="http://schemas.microsoft.com/office/powerpoint/2010/main" val="2801039664"/>
+              </p:ext>
+            </p:extLst>
+          </p:nvPr>
+        </p:nvGraphicFramePr>
+        <p:xfrm>
+          <a:off x="1752600" y="3048000"/>
+          <a:ext cx="5724525" cy="1185863"/>
+        </p:xfrm>
+        <a:graphic>
+          <a:graphicData uri="http://schemas.openxmlformats.org/presentationml/2006/ole">
+            <mc:AlternateContent xmlns:mc="http://schemas.openxmlformats.org/markup-compatibility/2006">
+              <mc:Choice xmlns:v="urn:schemas-microsoft-com:vml" Requires="v">
+                <p:oleObj spid="_x0000_s1029" name="Equation" r:id="rId6" imgW="2209800" imgH="457200" progId="Equation.3">
+                  <p:embed/>
+                </p:oleObj>
+              </mc:Choice>
+              <mc:Fallback>
+                <p:oleObj name="Equation" r:id="rId6" imgW="2209800" imgH="457200" progId="Equation.3">
+                  <p:embed/>
+                  <p:pic>
+                    <p:nvPicPr>
+                      <p:cNvPr id="0" name=""/>
+                      <p:cNvPicPr/>
+                      <p:nvPr/>
+                    </p:nvPicPr>
+                    <p:blipFill>
+                      <a:blip r:embed="rId7"/>
+                      <a:stretch>
+                        <a:fillRect/>
+                      </a:stretch>
+                    </p:blipFill>
+                    <p:spPr>
+                      <a:xfrm>
+                        <a:off x="1752600" y="3048000"/>
+                        <a:ext cx="5724525" cy="1185863"/>
+                      </a:xfrm>
+                      <a:prstGeom prst="rect">
+                        <a:avLst/>
+                      </a:prstGeom>
+                    </p:spPr>
+                  </p:pic>
+                </p:oleObj>
+              </mc:Fallback>
+            </mc:AlternateContent>
+          </a:graphicData>
+        </a:graphic>
+      </p:graphicFrame>
+    </p:spTree>
+    <p:extLst>
+      <p:ext uri="{BB962C8B-B14F-4D97-AF65-F5344CB8AC3E}">
+        <p14:creationId xmlns:p14="http://schemas.microsoft.com/office/powerpoint/2010/main" val="2718211149"/>
+      </p:ext>
+    </p:extLst>
+  </p:cSld>
+  <p:clrMapOvr>
+    <a:masterClrMapping/>
+  </p:clrMapOvr>
+  <p:timing>
+    <p:tnLst>
+      <p:par>
+        <p:cTn xmlns:p14="http://schemas.microsoft.com/office/powerpoint/2010/main" id="1" dur="indefinite" restart="never" nodeType="tmRoot"/>
+      </p:par>
+    </p:tnLst>
+  </p:timing>
+</p:sld>
+</file>
+
+<file path=ppt/slides/slide6.xml><?xml version="1.0" encoding="utf-8"?>
+<p:sld xmlns:a="http://schemas.openxmlformats.org/drawingml/2006/main" xmlns:r="http://schemas.openxmlformats.org/officeDocument/2006/relationships" xmlns:p="http://schemas.openxmlformats.org/presentationml/2006/main">
+  <p:cSld>
+    <p:spTree>
+      <p:nvGrpSpPr>
+        <p:cNvPr id="1" name=""/>
+        <p:cNvGrpSpPr/>
+        <p:nvPr/>
+      </p:nvGrpSpPr>
+      <p:grpSpPr>
+        <a:xfrm>
+          <a:off x="0" y="0"/>
+          <a:ext cx="0" cy="0"/>
+          <a:chOff x="0" y="0"/>
+          <a:chExt cx="0" cy="0"/>
+        </a:xfrm>
+      </p:grpSpPr>
+      <p:sp>
+        <p:nvSpPr>
+          <p:cNvPr id="2" name="Title 1"/>
+          <p:cNvSpPr>
+            <a:spLocks noGrp="1"/>
+          </p:cNvSpPr>
+          <p:nvPr>
+            <p:ph type="ctrTitle"/>
+          </p:nvPr>
+        </p:nvSpPr>
+        <p:spPr>
+          <a:xfrm>
+            <a:off x="609600" y="76201"/>
+            <a:ext cx="7772400" cy="762000"/>
+          </a:xfrm>
+        </p:spPr>
+        <p:txBody>
+          <a:bodyPr>
+            <a:normAutofit/>
+          </a:bodyPr>
+          <a:lstStyle/>
+          <a:p>
+            <a:r>
+              <a:rPr lang="en-US" sz="3200" dirty="0" smtClean="0">
+                <a:solidFill>
+                  <a:schemeClr val="accent2">
+                    <a:lumMod val="75000"/>
+                  </a:schemeClr>
+                </a:solidFill>
+              </a:rPr>
+              <a:t>Matrices and Random Variables</a:t>
+            </a:r>
+            <a:endParaRPr lang="en-US" sz="3200" dirty="0">
+              <a:solidFill>
+                <a:schemeClr val="accent2">
+                  <a:lumMod val="75000"/>
+                </a:schemeClr>
+              </a:solidFill>
+            </a:endParaRPr>
+          </a:p>
+        </p:txBody>
+      </p:sp>
+      <p:sp>
+        <p:nvSpPr>
+          <p:cNvPr id="4" name="Footer Placeholder 3"/>
+          <p:cNvSpPr>
+            <a:spLocks noGrp="1"/>
+          </p:cNvSpPr>
+          <p:nvPr>
+            <p:ph type="ftr" sz="quarter" idx="11"/>
+          </p:nvPr>
+        </p:nvSpPr>
+        <p:spPr/>
+        <p:txBody>
+          <a:bodyPr/>
+          <a:lstStyle/>
+          <a:p>
+            <a:r>
+              <a:rPr lang="en-US" dirty="0" smtClean="0">
+                <a:solidFill>
+                  <a:schemeClr val="accent1"/>
+                </a:solidFill>
+              </a:rPr>
+              <a:t>STT 465, MSU, Fall, 2015</a:t>
+            </a:r>
+            <a:endParaRPr lang="en-US" dirty="0">
+              <a:solidFill>
+                <a:schemeClr val="accent1"/>
+              </a:solidFill>
+            </a:endParaRPr>
+          </a:p>
+        </p:txBody>
+      </p:sp>
+      <p:sp>
+        <p:nvSpPr>
+          <p:cNvPr id="6" name="TextBox 5"/>
+          <p:cNvSpPr txBox="1"/>
+          <p:nvPr/>
+        </p:nvSpPr>
+        <p:spPr>
+          <a:xfrm>
+            <a:off x="381000" y="762000"/>
+            <a:ext cx="8229600" cy="5632312"/>
+          </a:xfrm>
+          <a:prstGeom prst="rect">
+            <a:avLst/>
+          </a:prstGeom>
+          <a:noFill/>
+          <a:ln>
+            <a:solidFill>
+              <a:srgbClr val="800000"/>
+            </a:solidFill>
+            <a:prstDash val="sysDash"/>
+          </a:ln>
+        </p:spPr>
+        <p:txBody>
+          <a:bodyPr wrap="square" rtlCol="0">
+            <a:spAutoFit/>
+          </a:bodyPr>
+          <a:lstStyle/>
+          <a:p>
+            <a:r>
+              <a:rPr lang="en-US" b="1" u="sng" dirty="0" smtClean="0">
+                <a:solidFill>
+                  <a:schemeClr val="accent1">
+                    <a:lumMod val="75000"/>
+                  </a:schemeClr>
+                </a:solidFill>
+              </a:rPr>
+              <a:t>- Multivariate Normal Distribution</a:t>
+            </a:r>
+          </a:p>
+          <a:p>
+            <a:endParaRPr lang="en-US" dirty="0">
+              <a:solidFill>
+                <a:schemeClr val="accent1">
+                  <a:lumMod val="75000"/>
+                </a:schemeClr>
+              </a:solidFill>
+            </a:endParaRPr>
+          </a:p>
+          <a:p>
+            <a:endParaRPr lang="en-US" dirty="0" smtClean="0">
+              <a:solidFill>
+                <a:schemeClr val="accent1">
+                  <a:lumMod val="75000"/>
+                </a:schemeClr>
+              </a:solidFill>
+            </a:endParaRPr>
+          </a:p>
+          <a:p>
+            <a:endParaRPr lang="en-US" dirty="0">
+              <a:solidFill>
+                <a:schemeClr val="accent1">
+                  <a:lumMod val="75000"/>
+                </a:schemeClr>
+              </a:solidFill>
+            </a:endParaRPr>
+          </a:p>
+          <a:p>
+            <a:endParaRPr lang="en-US" dirty="0">
+              <a:solidFill>
+                <a:schemeClr val="accent1">
+                  <a:lumMod val="75000"/>
+                </a:schemeClr>
+              </a:solidFill>
+            </a:endParaRPr>
+          </a:p>
+          <a:p>
+            <a:endParaRPr lang="en-US" dirty="0" smtClean="0">
+              <a:solidFill>
+                <a:schemeClr val="accent1">
+                  <a:lumMod val="75000"/>
+                </a:schemeClr>
+              </a:solidFill>
+            </a:endParaRPr>
+          </a:p>
+          <a:p>
+            <a:endParaRPr lang="en-US" dirty="0">
+              <a:solidFill>
+                <a:schemeClr val="accent1">
+                  <a:lumMod val="75000"/>
+                </a:schemeClr>
+              </a:solidFill>
+            </a:endParaRPr>
+          </a:p>
+          <a:p>
+            <a:endParaRPr lang="en-US" dirty="0" smtClean="0">
+              <a:solidFill>
+                <a:schemeClr val="accent1">
+                  <a:lumMod val="75000"/>
+                </a:schemeClr>
+              </a:solidFill>
+            </a:endParaRPr>
+          </a:p>
+          <a:p>
+            <a:endParaRPr lang="en-US" dirty="0">
+              <a:solidFill>
+                <a:schemeClr val="accent1">
+                  <a:lumMod val="75000"/>
+                </a:schemeClr>
+              </a:solidFill>
+            </a:endParaRPr>
+          </a:p>
+          <a:p>
+            <a:endParaRPr lang="en-US" dirty="0" smtClean="0">
+              <a:solidFill>
+                <a:schemeClr val="accent1">
+                  <a:lumMod val="75000"/>
+                </a:schemeClr>
+              </a:solidFill>
+            </a:endParaRPr>
+          </a:p>
+          <a:p>
+            <a:endParaRPr lang="en-US" dirty="0" smtClean="0">
+              <a:solidFill>
+                <a:schemeClr val="accent1">
+                  <a:lumMod val="75000"/>
+                </a:schemeClr>
+              </a:solidFill>
+            </a:endParaRPr>
+          </a:p>
+          <a:p>
+            <a:endParaRPr lang="en-US" dirty="0">
+              <a:solidFill>
+                <a:schemeClr val="accent1">
+                  <a:lumMod val="75000"/>
+                </a:schemeClr>
+              </a:solidFill>
+            </a:endParaRPr>
+          </a:p>
+          <a:p>
+            <a:endParaRPr lang="en-US" dirty="0" smtClean="0">
+              <a:solidFill>
+                <a:schemeClr val="accent1">
+                  <a:lumMod val="75000"/>
+                </a:schemeClr>
+              </a:solidFill>
+            </a:endParaRPr>
+          </a:p>
+          <a:p>
+            <a:endParaRPr lang="en-US" dirty="0" smtClean="0">
+              <a:solidFill>
+                <a:schemeClr val="accent1">
+                  <a:lumMod val="75000"/>
+                </a:schemeClr>
+              </a:solidFill>
+            </a:endParaRPr>
+          </a:p>
+          <a:p>
+            <a:endParaRPr lang="en-US" dirty="0">
+              <a:solidFill>
+                <a:schemeClr val="accent1">
+                  <a:lumMod val="75000"/>
+                </a:schemeClr>
+              </a:solidFill>
+            </a:endParaRPr>
+          </a:p>
+          <a:p>
+            <a:endParaRPr lang="en-US" dirty="0" smtClean="0">
+              <a:solidFill>
+                <a:schemeClr val="accent1">
+                  <a:lumMod val="75000"/>
+                </a:schemeClr>
+              </a:solidFill>
+            </a:endParaRPr>
+          </a:p>
+          <a:p>
+            <a:endParaRPr lang="en-US" dirty="0">
+              <a:solidFill>
+                <a:schemeClr val="accent1">
+                  <a:lumMod val="75000"/>
+                </a:schemeClr>
+              </a:solidFill>
+            </a:endParaRPr>
+          </a:p>
+          <a:p>
+            <a:endParaRPr lang="en-US" dirty="0" smtClean="0">
+              <a:solidFill>
+                <a:schemeClr val="accent1">
+                  <a:lumMod val="75000"/>
+                </a:schemeClr>
+              </a:solidFill>
+            </a:endParaRPr>
+          </a:p>
+          <a:p>
+            <a:endParaRPr lang="en-US" dirty="0">
+              <a:solidFill>
+                <a:schemeClr val="accent1">
+                  <a:lumMod val="75000"/>
+                </a:schemeClr>
+              </a:solidFill>
+            </a:endParaRPr>
+          </a:p>
+          <a:p>
+            <a:endParaRPr lang="en-US" dirty="0">
+              <a:solidFill>
+                <a:schemeClr val="accent1">
+                  <a:lumMod val="75000"/>
+                </a:schemeClr>
+              </a:solidFill>
+            </a:endParaRPr>
+          </a:p>
+        </p:txBody>
+      </p:sp>
+      <p:graphicFrame>
+        <p:nvGraphicFramePr>
+          <p:cNvPr id="3" name="Object 2"/>
+          <p:cNvGraphicFramePr>
+            <a:graphicFrameLocks noChangeAspect="1"/>
+          </p:cNvGraphicFramePr>
+          <p:nvPr>
+            <p:extLst>
+              <p:ext uri="{D42A27DB-BD31-4B8C-83A1-F6EECF244321}">
+                <p14:modId xmlns:p14="http://schemas.microsoft.com/office/powerpoint/2010/main" val="1254517508"/>
+              </p:ext>
+            </p:extLst>
+          </p:nvPr>
+        </p:nvGraphicFramePr>
+        <p:xfrm>
+          <a:off x="1981200" y="1371600"/>
+          <a:ext cx="2938463" cy="498475"/>
+        </p:xfrm>
+        <a:graphic>
+          <a:graphicData uri="http://schemas.openxmlformats.org/presentationml/2006/ole">
+            <mc:AlternateContent xmlns:mc="http://schemas.openxmlformats.org/markup-compatibility/2006">
+              <mc:Choice xmlns:v="urn:schemas-microsoft-com:vml" Requires="v">
+                <p:oleObj spid="_x0000_s2051" name="Equation" r:id="rId4" imgW="1422400" imgH="241300" progId="Equation.3">
+                  <p:embed/>
+                </p:oleObj>
+              </mc:Choice>
+              <mc:Fallback>
+                <p:oleObj name="Equation" r:id="rId4" imgW="1422400" imgH="241300" progId="Equation.3">
+                  <p:embed/>
+                  <p:pic>
+                    <p:nvPicPr>
+                      <p:cNvPr id="0" name=""/>
+                      <p:cNvPicPr/>
+                      <p:nvPr/>
+                    </p:nvPicPr>
+                    <p:blipFill>
+                      <a:blip r:embed="rId5"/>
+                      <a:stretch>
+                        <a:fillRect/>
+                      </a:stretch>
+                    </p:blipFill>
+                    <p:spPr>
+                      <a:xfrm>
+                        <a:off x="1981200" y="1371600"/>
+                        <a:ext cx="2938463" cy="498475"/>
+                      </a:xfrm>
+                      <a:prstGeom prst="rect">
+                        <a:avLst/>
+                      </a:prstGeom>
+                    </p:spPr>
+                  </p:pic>
+                </p:oleObj>
+              </mc:Fallback>
+            </mc:AlternateContent>
+          </a:graphicData>
+        </a:graphic>
+      </p:graphicFrame>
+      <p:graphicFrame>
+        <p:nvGraphicFramePr>
+          <p:cNvPr id="5" name="Object 4"/>
+          <p:cNvGraphicFramePr>
+            <a:graphicFrameLocks noChangeAspect="1"/>
+          </p:cNvGraphicFramePr>
+          <p:nvPr>
+            <p:extLst>
+              <p:ext uri="{D42A27DB-BD31-4B8C-83A1-F6EECF244321}">
+                <p14:modId xmlns:p14="http://schemas.microsoft.com/office/powerpoint/2010/main" val="3257213290"/>
+              </p:ext>
+            </p:extLst>
+          </p:nvPr>
+        </p:nvGraphicFramePr>
+        <p:xfrm>
+          <a:off x="990600" y="4114800"/>
+          <a:ext cx="6889750" cy="1307176"/>
+        </p:xfrm>
+        <a:graphic>
+          <a:graphicData uri="http://schemas.openxmlformats.org/presentationml/2006/ole">
+            <mc:AlternateContent xmlns:mc="http://schemas.openxmlformats.org/markup-compatibility/2006">
+              <mc:Choice xmlns:v="urn:schemas-microsoft-com:vml" Requires="v">
+                <p:oleObj spid="_x0000_s2052" name="Equation" r:id="rId6" imgW="3352800" imgH="635000" progId="Equation.3">
+                  <p:embed/>
+                </p:oleObj>
+              </mc:Choice>
+              <mc:Fallback>
+                <p:oleObj name="Equation" r:id="rId6" imgW="3352800" imgH="635000" progId="Equation.3">
+                  <p:embed/>
+                  <p:pic>
+                    <p:nvPicPr>
+                      <p:cNvPr id="0" name=""/>
+                      <p:cNvPicPr/>
+                      <p:nvPr/>
+                    </p:nvPicPr>
+                    <p:blipFill>
+                      <a:blip r:embed="rId7"/>
+                      <a:stretch>
+                        <a:fillRect/>
+                      </a:stretch>
+                    </p:blipFill>
+                    <p:spPr>
+                      <a:xfrm>
+                        <a:off x="990600" y="4114800"/>
+                        <a:ext cx="6889750" cy="1307176"/>
+                      </a:xfrm>
+                      <a:prstGeom prst="rect">
+                        <a:avLst/>
+                      </a:prstGeom>
+                    </p:spPr>
+                  </p:pic>
+                </p:oleObj>
+              </mc:Fallback>
+            </mc:AlternateContent>
+          </a:graphicData>
+        </a:graphic>
+      </p:graphicFrame>
+      <p:graphicFrame>
+        <p:nvGraphicFramePr>
+          <p:cNvPr id="7" name="Object 6"/>
+          <p:cNvGraphicFramePr>
+            <a:graphicFrameLocks noChangeAspect="1"/>
+          </p:cNvGraphicFramePr>
+          <p:nvPr>
+            <p:extLst>
+              <p:ext uri="{D42A27DB-BD31-4B8C-83A1-F6EECF244321}">
+                <p14:modId xmlns:p14="http://schemas.microsoft.com/office/powerpoint/2010/main" val="3979945335"/>
+              </p:ext>
+            </p:extLst>
+          </p:nvPr>
+        </p:nvGraphicFramePr>
+        <p:xfrm>
+          <a:off x="685800" y="2209800"/>
+          <a:ext cx="2728913" cy="498475"/>
+        </p:xfrm>
+        <a:graphic>
+          <a:graphicData uri="http://schemas.openxmlformats.org/presentationml/2006/ole">
+            <mc:AlternateContent xmlns:mc="http://schemas.openxmlformats.org/markup-compatibility/2006">
+              <mc:Choice xmlns:v="urn:schemas-microsoft-com:vml" Requires="v">
+                <p:oleObj spid="_x0000_s2053" name="Equation" r:id="rId8" imgW="1320800" imgH="241300" progId="Equation.3">
+                  <p:embed/>
+                </p:oleObj>
+              </mc:Choice>
+              <mc:Fallback>
+                <p:oleObj name="Equation" r:id="rId8" imgW="1320800" imgH="241300" progId="Equation.3">
+                  <p:embed/>
+                  <p:pic>
+                    <p:nvPicPr>
+                      <p:cNvPr id="0" name=""/>
+                      <p:cNvPicPr/>
+                      <p:nvPr/>
+                    </p:nvPicPr>
+                    <p:blipFill>
+                      <a:blip r:embed="rId9"/>
+                      <a:stretch>
+                        <a:fillRect/>
+                      </a:stretch>
+                    </p:blipFill>
+                    <p:spPr>
+                      <a:xfrm>
+                        <a:off x="685800" y="2209800"/>
+                        <a:ext cx="2728913" cy="498475"/>
+                      </a:xfrm>
+                      <a:prstGeom prst="rect">
+                        <a:avLst/>
+                      </a:prstGeom>
+                    </p:spPr>
+                  </p:pic>
+                </p:oleObj>
+              </mc:Fallback>
+            </mc:AlternateContent>
+          </a:graphicData>
+        </a:graphic>
+      </p:graphicFrame>
+      <p:graphicFrame>
+        <p:nvGraphicFramePr>
+          <p:cNvPr id="8" name="Object 7"/>
+          <p:cNvGraphicFramePr>
+            <a:graphicFrameLocks noChangeAspect="1"/>
+          </p:cNvGraphicFramePr>
+          <p:nvPr>
+            <p:extLst>
+              <p:ext uri="{D42A27DB-BD31-4B8C-83A1-F6EECF244321}">
+                <p14:modId xmlns:p14="http://schemas.microsoft.com/office/powerpoint/2010/main" val="1103263029"/>
+              </p:ext>
+            </p:extLst>
+          </p:nvPr>
+        </p:nvGraphicFramePr>
+        <p:xfrm>
+          <a:off x="762000" y="3048000"/>
+          <a:ext cx="1758950" cy="498475"/>
+        </p:xfrm>
+        <a:graphic>
+          <a:graphicData uri="http://schemas.openxmlformats.org/presentationml/2006/ole">
+            <mc:AlternateContent xmlns:mc="http://schemas.openxmlformats.org/markup-compatibility/2006">
+              <mc:Choice xmlns:v="urn:schemas-microsoft-com:vml" Requires="v">
+                <p:oleObj spid="_x0000_s2054" name="Equation" r:id="rId10" imgW="850900" imgH="241300" progId="Equation.3">
+                  <p:embed/>
+                </p:oleObj>
+              </mc:Choice>
+              <mc:Fallback>
+                <p:oleObj name="Equation" r:id="rId10" imgW="850900" imgH="241300" progId="Equation.3">
+                  <p:embed/>
+                  <p:pic>
+                    <p:nvPicPr>
+                      <p:cNvPr id="0" name=""/>
+                      <p:cNvPicPr/>
+                      <p:nvPr/>
+                    </p:nvPicPr>
+                    <p:blipFill>
+                      <a:blip r:embed="rId11"/>
+                      <a:stretch>
+                        <a:fillRect/>
+                      </a:stretch>
+                    </p:blipFill>
+                    <p:spPr>
+                      <a:xfrm>
+                        <a:off x="762000" y="3048000"/>
+                        <a:ext cx="1758950" cy="498475"/>
+                      </a:xfrm>
+                      <a:prstGeom prst="rect">
+                        <a:avLst/>
+                      </a:prstGeom>
+                    </p:spPr>
+                  </p:pic>
+                </p:oleObj>
+              </mc:Fallback>
+            </mc:AlternateContent>
+          </a:graphicData>
+        </a:graphic>
+      </p:graphicFrame>
+    </p:spTree>
+    <p:extLst>
+      <p:ext uri="{BB962C8B-B14F-4D97-AF65-F5344CB8AC3E}">
+        <p14:creationId xmlns:p14="http://schemas.microsoft.com/office/powerpoint/2010/main" val="1451716566"/>
       </p:ext>
     </p:extLst>
   </p:cSld>

</xml_diff>